<commit_message>
Added book examples, updated ch 8 example, updated slides
</commit_message>
<xml_diff>
--- a/docs/Slides/CIS399Wk2Day3a-Themes+Styles.pptx
+++ b/docs/Slides/CIS399Wk2Day3a-Themes+Styles.pptx
@@ -224,7 +224,7 @@
           <a:p>
             <a:fld id="{1FC32AA1-1225-9048-80C3-2B6F58548154}" type="datetimeFigureOut">
               <a:rPr lang="en-US" smtClean="0"/>
-              <a:t>6/29/18</a:t>
+              <a:t>7/3/19</a:t>
             </a:fld>
             <a:endParaRPr lang="en-US"/>
           </a:p>
@@ -1547,7 +1547,7 @@
           <a:p>
             <a:fld id="{12110144-19AD-4D4E-902D-E18AF93089D3}" type="datetimeFigureOut">
               <a:rPr lang="en-US" smtClean="0"/>
-              <a:t>6/29/18</a:t>
+              <a:t>7/3/19</a:t>
             </a:fld>
             <a:endParaRPr lang="en-US"/>
           </a:p>
@@ -1715,7 +1715,7 @@
           <a:p>
             <a:fld id="{12110144-19AD-4D4E-902D-E18AF93089D3}" type="datetimeFigureOut">
               <a:rPr lang="en-US" smtClean="0"/>
-              <a:t>6/29/18</a:t>
+              <a:t>7/3/19</a:t>
             </a:fld>
             <a:endParaRPr lang="en-US"/>
           </a:p>
@@ -1893,7 +1893,7 @@
           <a:p>
             <a:fld id="{12110144-19AD-4D4E-902D-E18AF93089D3}" type="datetimeFigureOut">
               <a:rPr lang="en-US" smtClean="0"/>
-              <a:t>6/29/18</a:t>
+              <a:t>7/3/19</a:t>
             </a:fld>
             <a:endParaRPr lang="en-US"/>
           </a:p>
@@ -2061,7 +2061,7 @@
           <a:p>
             <a:fld id="{12110144-19AD-4D4E-902D-E18AF93089D3}" type="datetimeFigureOut">
               <a:rPr lang="en-US" smtClean="0"/>
-              <a:t>6/29/18</a:t>
+              <a:t>7/3/19</a:t>
             </a:fld>
             <a:endParaRPr lang="en-US"/>
           </a:p>
@@ -2306,7 +2306,7 @@
           <a:p>
             <a:fld id="{12110144-19AD-4D4E-902D-E18AF93089D3}" type="datetimeFigureOut">
               <a:rPr lang="en-US" smtClean="0"/>
-              <a:t>6/29/18</a:t>
+              <a:t>7/3/19</a:t>
             </a:fld>
             <a:endParaRPr lang="en-US"/>
           </a:p>
@@ -2591,7 +2591,7 @@
           <a:p>
             <a:fld id="{12110144-19AD-4D4E-902D-E18AF93089D3}" type="datetimeFigureOut">
               <a:rPr lang="en-US" smtClean="0"/>
-              <a:t>6/29/18</a:t>
+              <a:t>7/3/19</a:t>
             </a:fld>
             <a:endParaRPr lang="en-US"/>
           </a:p>
@@ -3010,7 +3010,7 @@
           <a:p>
             <a:fld id="{12110144-19AD-4D4E-902D-E18AF93089D3}" type="datetimeFigureOut">
               <a:rPr lang="en-US" smtClean="0"/>
-              <a:t>6/29/18</a:t>
+              <a:t>7/3/19</a:t>
             </a:fld>
             <a:endParaRPr lang="en-US"/>
           </a:p>
@@ -3127,7 +3127,7 @@
           <a:p>
             <a:fld id="{12110144-19AD-4D4E-902D-E18AF93089D3}" type="datetimeFigureOut">
               <a:rPr lang="en-US" smtClean="0"/>
-              <a:t>6/29/18</a:t>
+              <a:t>7/3/19</a:t>
             </a:fld>
             <a:endParaRPr lang="en-US"/>
           </a:p>
@@ -3222,7 +3222,7 @@
           <a:p>
             <a:fld id="{12110144-19AD-4D4E-902D-E18AF93089D3}" type="datetimeFigureOut">
               <a:rPr lang="en-US" smtClean="0"/>
-              <a:t>6/29/18</a:t>
+              <a:t>7/3/19</a:t>
             </a:fld>
             <a:endParaRPr lang="en-US"/>
           </a:p>
@@ -3497,7 +3497,7 @@
           <a:p>
             <a:fld id="{12110144-19AD-4D4E-902D-E18AF93089D3}" type="datetimeFigureOut">
               <a:rPr lang="en-US" smtClean="0"/>
-              <a:t>6/29/18</a:t>
+              <a:t>7/3/19</a:t>
             </a:fld>
             <a:endParaRPr lang="en-US"/>
           </a:p>
@@ -3749,7 +3749,7 @@
           <a:p>
             <a:fld id="{12110144-19AD-4D4E-902D-E18AF93089D3}" type="datetimeFigureOut">
               <a:rPr lang="en-US" smtClean="0"/>
-              <a:t>6/29/18</a:t>
+              <a:t>7/3/19</a:t>
             </a:fld>
             <a:endParaRPr lang="en-US"/>
           </a:p>
@@ -3978,7 +3978,7 @@
           <a:p>
             <a:fld id="{12110144-19AD-4D4E-902D-E18AF93089D3}" type="datetimeFigureOut">
               <a:rPr lang="en-US" smtClean="0"/>
-              <a:t>6/29/18</a:t>
+              <a:t>7/3/19</a:t>
             </a:fld>
             <a:endParaRPr lang="en-US"/>
           </a:p>
@@ -6439,7 +6439,7 @@
         </p:spPr>
         <p:txBody>
           <a:bodyPr>
-            <a:normAutofit fontScale="85000" lnSpcReduction="20000"/>
+            <a:normAutofit fontScale="77500" lnSpcReduction="20000"/>
           </a:bodyPr>
           <a:lstStyle/>
           <a:p>
@@ -6467,147 +6467,145 @@
               <a:rPr lang="en-US" dirty="0"/>
               <a:t>Add an &lt;item&gt; element for each style attribute you want to define. For example, if you define the following style:</a:t>
             </a:r>
+            <a:br>
+              <a:rPr lang="en-US" dirty="0"/>
+            </a:br>
+            <a:endParaRPr lang="en-US" dirty="0"/>
           </a:p>
           <a:p>
             <a:pPr marL="0" indent="0">
               <a:buNone/>
             </a:pPr>
             <a:r>
-              <a:rPr lang="en-US" sz="2800" dirty="0"/>
-              <a:t>&lt;?xml version=</a:t>
-            </a:r>
-            <a:r>
-              <a:rPr lang="en-US" dirty="0"/>
-              <a:t>"1.0"</a:t>
-            </a:r>
-            <a:r>
-              <a:rPr lang="en-US" sz="2800" dirty="0"/>
-              <a:t> encoding=</a:t>
-            </a:r>
-            <a:r>
-              <a:rPr lang="en-US" dirty="0"/>
-              <a:t>"utf-8"</a:t>
-            </a:r>
-            <a:r>
-              <a:rPr lang="en-US" sz="2800" dirty="0"/>
-              <a:t>?&gt;</a:t>
+              <a:rPr lang="en-US" sz="3100" dirty="0">
+                <a:latin typeface="Courier" pitchFamily="2" charset="0"/>
+              </a:rPr>
+              <a:t>&lt;?xml version="1.0" encoding="utf-8"?&gt;</a:t>
             </a:r>
             <a:br>
-              <a:rPr lang="en-US" sz="2800" dirty="0"/>
+              <a:rPr lang="en-US" sz="3100" dirty="0">
+                <a:latin typeface="Courier" pitchFamily="2" charset="0"/>
+              </a:rPr>
             </a:br>
             <a:r>
-              <a:rPr lang="en-US" dirty="0"/>
+              <a:rPr lang="en-US" sz="3100" dirty="0">
+                <a:latin typeface="Courier" pitchFamily="2" charset="0"/>
+              </a:rPr>
               <a:t>&lt;resources&gt;</a:t>
             </a:r>
             <a:br>
-              <a:rPr lang="en-US" sz="2800" dirty="0"/>
+              <a:rPr lang="en-US" sz="3100" dirty="0">
+                <a:latin typeface="Courier" pitchFamily="2" charset="0"/>
+              </a:rPr>
             </a:br>
             <a:r>
-              <a:rPr lang="en-US" sz="2800" dirty="0"/>
-              <a:t>    </a:t>
-            </a:r>
-            <a:r>
-              <a:rPr lang="en-US" dirty="0"/>
-              <a:t>&lt;style</a:t>
-            </a:r>
-            <a:r>
-              <a:rPr lang="en-US" sz="2800" dirty="0"/>
-              <a:t> </a:t>
-            </a:r>
-            <a:r>
-              <a:rPr lang="en-US" dirty="0"/>
-              <a:t>name</a:t>
-            </a:r>
-            <a:r>
-              <a:rPr lang="en-US" sz="2800" dirty="0"/>
-              <a:t>=</a:t>
-            </a:r>
-            <a:r>
-              <a:rPr lang="en-US" dirty="0"/>
+              <a:rPr lang="en-US" sz="3100" dirty="0">
+                <a:latin typeface="Courier" pitchFamily="2" charset="0"/>
+              </a:rPr>
+              <a:t>	&lt;style name="</a:t>
+            </a:r>
+            <a:r>
+              <a:rPr lang="en-US" sz="3100" dirty="0" err="1">
+                <a:latin typeface="Courier" pitchFamily="2" charset="0"/>
+              </a:rPr>
+              <a:t>GreenText</a:t>
+            </a:r>
+            <a:r>
+              <a:rPr lang="en-US" sz="3100" dirty="0">
+                <a:latin typeface="Courier" pitchFamily="2" charset="0"/>
+              </a:rPr>
               <a:t>"</a:t>
             </a:r>
-            <a:r>
-              <a:rPr lang="en-US" dirty="0" err="1"/>
-              <a:t>GreenText</a:t>
-            </a:r>
-            <a:r>
-              <a:rPr lang="en-US" dirty="0"/>
-              <a:t>"</a:t>
-            </a:r>
-            <a:r>
-              <a:rPr lang="en-US" sz="2800" dirty="0"/>
-              <a:t> </a:t>
-            </a:r>
-            <a:r>
-              <a:rPr lang="en-US" dirty="0"/>
-              <a:t>parent</a:t>
-            </a:r>
-            <a:r>
-              <a:rPr lang="en-US" sz="2800" dirty="0"/>
-              <a:t>=</a:t>
-            </a:r>
-            <a:r>
-              <a:rPr lang="en-US" dirty="0"/>
-              <a:t>"</a:t>
-            </a:r>
-            <a:r>
-              <a:rPr lang="en-US" dirty="0" err="1"/>
+            <a:br>
+              <a:rPr lang="en-US" sz="3100" dirty="0">
+                <a:latin typeface="Courier" pitchFamily="2" charset="0"/>
+              </a:rPr>
+            </a:br>
+            <a:r>
+              <a:rPr lang="en-US" sz="3100" dirty="0">
+                <a:latin typeface="Courier" pitchFamily="2" charset="0"/>
+              </a:rPr>
+              <a:t>       parent="</a:t>
+            </a:r>
+            <a:r>
+              <a:rPr lang="en-US" sz="3100" dirty="0" err="1">
+                <a:latin typeface="Courier" pitchFamily="2" charset="0"/>
+              </a:rPr>
               <a:t>TextAppearance.AppCompat</a:t>
             </a:r>
             <a:r>
-              <a:rPr lang="en-US" dirty="0"/>
+              <a:rPr lang="en-US" sz="3100" dirty="0">
+                <a:latin typeface="Courier" pitchFamily="2" charset="0"/>
+              </a:rPr>
               <a:t>"&gt;</a:t>
             </a:r>
             <a:br>
-              <a:rPr lang="en-US" sz="2800" dirty="0"/>
+              <a:rPr lang="en-US" sz="3100" dirty="0">
+                <a:latin typeface="Courier" pitchFamily="2" charset="0"/>
+              </a:rPr>
             </a:br>
             <a:r>
-              <a:rPr lang="en-US" sz="2800" dirty="0"/>
-              <a:t>        &lt;item name=</a:t>
-            </a:r>
-            <a:r>
-              <a:rPr lang="en-US" dirty="0"/>
-              <a:t>"</a:t>
-            </a:r>
-            <a:r>
-              <a:rPr lang="en-US" dirty="0" err="1"/>
+              <a:rPr lang="en-US" sz="3100" dirty="0">
+                <a:latin typeface="Courier" pitchFamily="2" charset="0"/>
+              </a:rPr>
+              <a:t>     	&lt;item name="</a:t>
+            </a:r>
+            <a:r>
+              <a:rPr lang="en-US" sz="3100" dirty="0" err="1">
+                <a:latin typeface="Courier" pitchFamily="2" charset="0"/>
+              </a:rPr>
               <a:t>android:textColor</a:t>
             </a:r>
             <a:r>
-              <a:rPr lang="en-US" dirty="0"/>
-              <a:t>"</a:t>
-            </a:r>
-            <a:r>
-              <a:rPr lang="en-US" sz="2800" dirty="0"/>
-              <a:t>&gt;#</a:t>
-            </a:r>
-            <a:r>
-              <a:rPr lang="en-US" dirty="0"/>
-              <a:t>00FF00</a:t>
-            </a:r>
-            <a:r>
-              <a:rPr lang="en-US" sz="2800" dirty="0"/>
-              <a:t>&lt;/item&gt;</a:t>
+              <a:rPr lang="en-US" sz="3100" dirty="0">
+                <a:latin typeface="Courier" pitchFamily="2" charset="0"/>
+              </a:rPr>
+              <a:t>"&gt;</a:t>
             </a:r>
             <a:br>
-              <a:rPr lang="en-US" sz="2800" dirty="0"/>
+              <a:rPr lang="en-US" sz="3100" dirty="0">
+                <a:latin typeface="Courier" pitchFamily="2" charset="0"/>
+              </a:rPr>
             </a:br>
             <a:r>
-              <a:rPr lang="en-US" sz="2800" dirty="0"/>
-              <a:t>    </a:t>
-            </a:r>
-            <a:r>
-              <a:rPr lang="en-US" dirty="0"/>
-              <a:t>&lt;/style&gt;</a:t>
+              <a:rPr lang="en-US" sz="3100" dirty="0">
+                <a:latin typeface="Courier" pitchFamily="2" charset="0"/>
+              </a:rPr>
+              <a:t>         #00FF00</a:t>
             </a:r>
             <a:br>
-              <a:rPr lang="en-US" sz="2800" dirty="0"/>
+              <a:rPr lang="en-US" sz="3100" dirty="0">
+                <a:latin typeface="Courier" pitchFamily="2" charset="0"/>
+              </a:rPr>
             </a:br>
             <a:r>
-              <a:rPr lang="en-US" dirty="0"/>
+              <a:rPr lang="en-US" sz="3100" dirty="0">
+                <a:latin typeface="Courier" pitchFamily="2" charset="0"/>
+              </a:rPr>
+              <a:t>		&lt;/item&gt;</a:t>
+            </a:r>
+            <a:br>
+              <a:rPr lang="en-US" sz="3100" dirty="0">
+                <a:latin typeface="Courier" pitchFamily="2" charset="0"/>
+              </a:rPr>
+            </a:br>
+            <a:r>
+              <a:rPr lang="en-US" sz="3100" dirty="0">
+                <a:latin typeface="Courier" pitchFamily="2" charset="0"/>
+              </a:rPr>
+              <a:t>	&lt;/style&gt;</a:t>
+            </a:r>
+            <a:br>
+              <a:rPr lang="en-US" sz="3100" dirty="0">
+                <a:latin typeface="Courier" pitchFamily="2" charset="0"/>
+              </a:rPr>
+            </a:br>
+            <a:r>
+              <a:rPr lang="en-US" sz="3100" dirty="0">
+                <a:latin typeface="Courier" pitchFamily="2" charset="0"/>
+              </a:rPr>
               <a:t>&lt;/resources&gt;</a:t>
             </a:r>
-            <a:endParaRPr lang="en-US" sz="2600" dirty="0"/>
           </a:p>
         </p:txBody>
       </p:sp>
@@ -6704,53 +6702,79 @@
               <a:buNone/>
             </a:pPr>
             <a:r>
-              <a:rPr lang="en-US" dirty="0"/>
+              <a:rPr lang="en-US" dirty="0">
+                <a:latin typeface="Courier" pitchFamily="2" charset="0"/>
+              </a:rPr>
               <a:t>&lt;</a:t>
             </a:r>
             <a:r>
-              <a:rPr lang="en-US" dirty="0" err="1"/>
+              <a:rPr lang="en-US" dirty="0" err="1">
+                <a:latin typeface="Courier" pitchFamily="2" charset="0"/>
+              </a:rPr>
               <a:t>TextView</a:t>
             </a:r>
             <a:br>
-              <a:rPr lang="en-US" sz="2800" dirty="0"/>
+              <a:rPr lang="en-US" sz="2800" dirty="0">
+                <a:latin typeface="Courier" pitchFamily="2" charset="0"/>
+              </a:rPr>
             </a:br>
             <a:r>
-              <a:rPr lang="en-US" sz="2800" dirty="0"/>
+              <a:rPr lang="en-US" sz="2800" dirty="0">
+                <a:latin typeface="Courier" pitchFamily="2" charset="0"/>
+              </a:rPr>
               <a:t>    </a:t>
             </a:r>
             <a:r>
-              <a:rPr lang="en-US" dirty="0"/>
+              <a:rPr lang="en-US" dirty="0">
+                <a:latin typeface="Courier" pitchFamily="2" charset="0"/>
+              </a:rPr>
               <a:t>style</a:t>
             </a:r>
             <a:r>
-              <a:rPr lang="en-US" sz="2800" dirty="0"/>
+              <a:rPr lang="en-US" sz="2800" dirty="0">
+                <a:latin typeface="Courier" pitchFamily="2" charset="0"/>
+              </a:rPr>
               <a:t>=</a:t>
             </a:r>
             <a:r>
-              <a:rPr lang="en-US" dirty="0"/>
+              <a:rPr lang="en-US" dirty="0">
+                <a:latin typeface="Courier" pitchFamily="2" charset="0"/>
+              </a:rPr>
               <a:t>"</a:t>
             </a:r>
             <a:r>
-              <a:rPr lang="en-US" sz="2800" dirty="0"/>
+              <a:rPr lang="en-US" sz="2800" dirty="0">
+                <a:latin typeface="Courier" pitchFamily="2" charset="0"/>
+              </a:rPr>
               <a:t>@style/</a:t>
             </a:r>
             <a:r>
-              <a:rPr lang="en-US" sz="2800" dirty="0" err="1"/>
+              <a:rPr lang="en-US" sz="2800" dirty="0" err="1">
+                <a:latin typeface="Courier" pitchFamily="2" charset="0"/>
+              </a:rPr>
               <a:t>GreenText</a:t>
             </a:r>
             <a:r>
-              <a:rPr lang="en-US" dirty="0"/>
+              <a:rPr lang="en-US" dirty="0">
+                <a:latin typeface="Courier" pitchFamily="2" charset="0"/>
+              </a:rPr>
               <a:t>"</a:t>
             </a:r>
             <a:br>
-              <a:rPr lang="en-US" sz="2800" dirty="0"/>
+              <a:rPr lang="en-US" sz="2800" dirty="0">
+                <a:latin typeface="Courier" pitchFamily="2" charset="0"/>
+              </a:rPr>
             </a:br>
             <a:r>
-              <a:rPr lang="en-US" sz="2800" dirty="0"/>
+              <a:rPr lang="en-US" sz="2800" dirty="0">
+                <a:latin typeface="Courier" pitchFamily="2" charset="0"/>
+              </a:rPr>
               <a:t>    ... </a:t>
             </a:r>
             <a:r>
-              <a:rPr lang="en-US" dirty="0"/>
+              <a:rPr lang="en-US" dirty="0">
+                <a:latin typeface="Courier" pitchFamily="2" charset="0"/>
+              </a:rPr>
               <a:t>/&gt;</a:t>
             </a:r>
             <a:br>
@@ -6834,7 +6858,7 @@
         <p:spPr>
           <a:xfrm>
             <a:off x="457200" y="1237129"/>
-            <a:ext cx="8229600" cy="4861414"/>
+            <a:ext cx="8454788" cy="4861414"/>
           </a:xfrm>
         </p:spPr>
         <p:txBody>
@@ -6853,78 +6877,98 @@
               <a:buNone/>
             </a:pPr>
             <a:r>
-              <a:rPr lang="en-US" dirty="0"/>
-              <a:t>&lt;manifest</a:t>
-            </a:r>
-            <a:r>
-              <a:rPr lang="en-US" sz="2800" dirty="0"/>
-              <a:t> ... </a:t>
-            </a:r>
-            <a:r>
-              <a:rPr lang="en-US" dirty="0"/>
-              <a:t>&gt;</a:t>
+              <a:rPr lang="en-US" sz="2600" dirty="0">
+                <a:latin typeface="Courier" pitchFamily="2" charset="0"/>
+              </a:rPr>
+              <a:t>&lt;manifest ... &gt;</a:t>
             </a:r>
             <a:br>
-              <a:rPr lang="en-US" sz="2800" dirty="0"/>
+              <a:rPr lang="en-US" sz="2600" dirty="0">
+                <a:latin typeface="Courier" pitchFamily="2" charset="0"/>
+              </a:rPr>
             </a:br>
             <a:r>
-              <a:rPr lang="en-US" sz="2800" dirty="0"/>
-              <a:t>    </a:t>
-            </a:r>
-            <a:r>
-              <a:rPr lang="en-US" dirty="0"/>
-              <a:t>&lt;application</a:t>
-            </a:r>
-            <a:r>
-              <a:rPr lang="en-US" sz="2800" dirty="0"/>
-              <a:t> </a:t>
-            </a:r>
-            <a:r>
-              <a:rPr lang="en-US" dirty="0" err="1"/>
+              <a:rPr lang="en-US" sz="2600" dirty="0">
+                <a:latin typeface="Courier" pitchFamily="2" charset="0"/>
+              </a:rPr>
+              <a:t>   &lt;application </a:t>
+            </a:r>
+            <a:br>
+              <a:rPr lang="en-US" sz="2600" dirty="0">
+                <a:latin typeface="Courier" pitchFamily="2" charset="0"/>
+              </a:rPr>
+            </a:br>
+            <a:r>
+              <a:rPr lang="en-US" sz="2600" dirty="0">
+                <a:latin typeface="Courier" pitchFamily="2" charset="0"/>
+              </a:rPr>
+              <a:t>     </a:t>
+            </a:r>
+            <a:r>
+              <a:rPr lang="en-US" sz="2600" dirty="0" err="1">
+                <a:latin typeface="Courier" pitchFamily="2" charset="0"/>
+              </a:rPr>
               <a:t>android:theme</a:t>
             </a:r>
             <a:r>
-              <a:rPr lang="en-US" sz="2800" dirty="0"/>
-              <a:t>=</a:t>
-            </a:r>
-            <a:r>
-              <a:rPr lang="en-US" dirty="0"/>
-              <a:t>"@style/</a:t>
-            </a:r>
-            <a:r>
-              <a:rPr lang="en-US" dirty="0" err="1"/>
+              <a:rPr lang="en-US" sz="2600" dirty="0">
+                <a:latin typeface="Courier" pitchFamily="2" charset="0"/>
+              </a:rPr>
+              <a:t>="@style/</a:t>
+            </a:r>
+            <a:r>
+              <a:rPr lang="en-US" sz="2600" dirty="0" err="1">
+                <a:latin typeface="Courier" pitchFamily="2" charset="0"/>
+              </a:rPr>
               <a:t>Theme.AppCompat</a:t>
             </a:r>
             <a:r>
-              <a:rPr lang="en-US" dirty="0"/>
-              <a:t>"</a:t>
-            </a:r>
-            <a:r>
-              <a:rPr lang="en-US" sz="2800" dirty="0"/>
-              <a:t> ... </a:t>
-            </a:r>
-            <a:r>
-              <a:rPr lang="en-US" dirty="0"/>
-              <a:t>&gt;</a:t>
+              <a:rPr lang="en-US" sz="2600" dirty="0">
+                <a:latin typeface="Courier" pitchFamily="2" charset="0"/>
+              </a:rPr>
+              <a:t>" </a:t>
             </a:r>
             <a:br>
-              <a:rPr lang="en-US" sz="2800" dirty="0"/>
+              <a:rPr lang="en-US" sz="2600" dirty="0">
+                <a:latin typeface="Courier" pitchFamily="2" charset="0"/>
+              </a:rPr>
             </a:br>
             <a:r>
-              <a:rPr lang="en-US" sz="2800" dirty="0"/>
-              <a:t>    </a:t>
-            </a:r>
-            <a:r>
-              <a:rPr lang="en-US" dirty="0"/>
-              <a:t>&lt;/application&gt;</a:t>
+              <a:rPr lang="en-US" sz="2600" dirty="0">
+                <a:latin typeface="Courier" pitchFamily="2" charset="0"/>
+              </a:rPr>
+              <a:t>     ... &gt;</a:t>
             </a:r>
             <a:br>
-              <a:rPr lang="en-US" sz="2800" dirty="0"/>
+              <a:rPr lang="en-US" sz="2600" dirty="0">
+                <a:latin typeface="Courier" pitchFamily="2" charset="0"/>
+              </a:rPr>
             </a:br>
             <a:r>
-              <a:rPr lang="en-US" dirty="0"/>
+              <a:rPr lang="en-US" sz="2600" dirty="0">
+                <a:latin typeface="Courier" pitchFamily="2" charset="0"/>
+              </a:rPr>
+              <a:t>    &lt;/application&gt;</a:t>
+            </a:r>
+            <a:br>
+              <a:rPr lang="en-US" sz="2600" dirty="0">
+                <a:latin typeface="Courier" pitchFamily="2" charset="0"/>
+              </a:rPr>
+            </a:br>
+            <a:r>
+              <a:rPr lang="en-US" sz="2600" dirty="0">
+                <a:latin typeface="Courier" pitchFamily="2" charset="0"/>
+              </a:rPr>
               <a:t>&lt;/manifest&gt;</a:t>
             </a:r>
+            <a:br>
+              <a:rPr lang="en-US" sz="2600" dirty="0">
+                <a:latin typeface="Courier" pitchFamily="2" charset="0"/>
+              </a:rPr>
+            </a:br>
+            <a:endParaRPr lang="en-US" sz="2600" dirty="0">
+              <a:latin typeface="Courier" pitchFamily="2" charset="0"/>
+            </a:endParaRPr>
           </a:p>
           <a:p>
             <a:r>
@@ -6937,112 +6981,120 @@
               <a:buNone/>
             </a:pPr>
             <a:r>
-              <a:rPr lang="en-US" dirty="0"/>
-              <a:t>&lt;manifest</a:t>
-            </a:r>
-            <a:r>
-              <a:rPr lang="en-US" sz="2800" dirty="0"/>
-              <a:t> ... </a:t>
-            </a:r>
-            <a:r>
-              <a:rPr lang="en-US" dirty="0"/>
-              <a:t>&gt;</a:t>
+              <a:rPr lang="en-US" sz="2600" dirty="0">
+                <a:latin typeface="Courier" pitchFamily="2" charset="0"/>
+              </a:rPr>
+              <a:t>&lt;manifest ... &gt;</a:t>
             </a:r>
             <a:br>
-              <a:rPr lang="en-US" sz="2800" dirty="0"/>
+              <a:rPr lang="en-US" sz="2600" dirty="0">
+                <a:latin typeface="Courier" pitchFamily="2" charset="0"/>
+              </a:rPr>
             </a:br>
             <a:r>
-              <a:rPr lang="en-US" sz="2800" dirty="0"/>
-              <a:t>    </a:t>
-            </a:r>
-            <a:r>
-              <a:rPr lang="en-US" dirty="0"/>
-              <a:t>&lt;application</a:t>
-            </a:r>
-            <a:r>
-              <a:rPr lang="en-US" sz="2800" dirty="0"/>
-              <a:t> ... </a:t>
-            </a:r>
-            <a:r>
-              <a:rPr lang="en-US" dirty="0"/>
-              <a:t>&gt;</a:t>
+              <a:rPr lang="en-US" sz="2600" dirty="0">
+                <a:latin typeface="Courier" pitchFamily="2" charset="0"/>
+              </a:rPr>
+              <a:t>    &lt;application ... &gt;</a:t>
             </a:r>
             <a:br>
-              <a:rPr lang="en-US" sz="2800" dirty="0"/>
+              <a:rPr lang="en-US" sz="2600" dirty="0">
+                <a:latin typeface="Courier" pitchFamily="2" charset="0"/>
+              </a:rPr>
             </a:br>
             <a:r>
-              <a:rPr lang="en-US" sz="2800" dirty="0"/>
-              <a:t>        </a:t>
-            </a:r>
-            <a:r>
-              <a:rPr lang="en-US" dirty="0"/>
-              <a:t>&lt;activity</a:t>
-            </a:r>
-            <a:r>
-              <a:rPr lang="en-US" sz="2800" dirty="0"/>
-              <a:t> </a:t>
-            </a:r>
-            <a:r>
-              <a:rPr lang="en-US" dirty="0" err="1"/>
+              <a:rPr lang="en-US" sz="2600" dirty="0">
+                <a:latin typeface="Courier" pitchFamily="2" charset="0"/>
+              </a:rPr>
+              <a:t>        &lt;activity</a:t>
+            </a:r>
+            <a:br>
+              <a:rPr lang="en-US" sz="2600" dirty="0">
+                <a:latin typeface="Courier" pitchFamily="2" charset="0"/>
+              </a:rPr>
+            </a:br>
+            <a:r>
+              <a:rPr lang="en-US" sz="2600" dirty="0">
+                <a:latin typeface="Courier" pitchFamily="2" charset="0"/>
+              </a:rPr>
+              <a:t>          </a:t>
+            </a:r>
+            <a:r>
+              <a:rPr lang="en-US" sz="2600" dirty="0" err="1">
+                <a:latin typeface="Courier" pitchFamily="2" charset="0"/>
+              </a:rPr>
               <a:t>android:theme</a:t>
             </a:r>
             <a:r>
-              <a:rPr lang="en-US" sz="2800" dirty="0"/>
-              <a:t>=</a:t>
-            </a:r>
-            <a:r>
-              <a:rPr lang="en-US" dirty="0"/>
-              <a:t>"@style/</a:t>
-            </a:r>
-            <a:r>
-              <a:rPr lang="en-US" dirty="0" err="1"/>
+              <a:rPr lang="en-US" sz="2600" dirty="0">
+                <a:latin typeface="Courier" pitchFamily="2" charset="0"/>
+              </a:rPr>
+              <a:t>="@style/</a:t>
+            </a:r>
+            <a:r>
+              <a:rPr lang="en-US" sz="2600" dirty="0" err="1">
+                <a:latin typeface="Courier" pitchFamily="2" charset="0"/>
+              </a:rPr>
               <a:t>Theme.AppCompat.Light</a:t>
             </a:r>
             <a:r>
-              <a:rPr lang="en-US" dirty="0"/>
-              <a:t>"</a:t>
-            </a:r>
-            <a:r>
-              <a:rPr lang="en-US" sz="2800" dirty="0"/>
-              <a:t> ... </a:t>
-            </a:r>
-            <a:r>
-              <a:rPr lang="en-US" dirty="0"/>
-              <a:t>&gt;</a:t>
+              <a:rPr lang="en-US" sz="2600" dirty="0">
+                <a:latin typeface="Courier" pitchFamily="2" charset="0"/>
+              </a:rPr>
+              <a:t>”</a:t>
             </a:r>
             <a:br>
-              <a:rPr lang="en-US" sz="2800" dirty="0"/>
+              <a:rPr lang="en-US" sz="2600" dirty="0">
+                <a:latin typeface="Courier" pitchFamily="2" charset="0"/>
+              </a:rPr>
             </a:br>
             <a:r>
-              <a:rPr lang="en-US" sz="2800" dirty="0"/>
-              <a:t>        </a:t>
-            </a:r>
-            <a:r>
-              <a:rPr lang="en-US" dirty="0"/>
-              <a:t>&lt;/activity&gt;</a:t>
+              <a:rPr lang="en-US" sz="2600" dirty="0">
+                <a:latin typeface="Courier" pitchFamily="2" charset="0"/>
+              </a:rPr>
+              <a:t>          ... &gt;</a:t>
             </a:r>
             <a:br>
-              <a:rPr lang="en-US" sz="2800" dirty="0"/>
+              <a:rPr lang="en-US" sz="2600" dirty="0">
+                <a:latin typeface="Courier" pitchFamily="2" charset="0"/>
+              </a:rPr>
             </a:br>
             <a:r>
-              <a:rPr lang="en-US" sz="2800" dirty="0"/>
-              <a:t>    </a:t>
-            </a:r>
-            <a:r>
-              <a:rPr lang="en-US" dirty="0"/>
-              <a:t>&lt;/application&gt;</a:t>
+              <a:rPr lang="en-US" sz="2600" dirty="0">
+                <a:latin typeface="Courier" pitchFamily="2" charset="0"/>
+              </a:rPr>
+              <a:t>        &lt;/activity&gt;</a:t>
             </a:r>
             <a:br>
-              <a:rPr lang="en-US" sz="2800" dirty="0"/>
+              <a:rPr lang="en-US" sz="2600" dirty="0">
+                <a:latin typeface="Courier" pitchFamily="2" charset="0"/>
+              </a:rPr>
             </a:br>
             <a:r>
-              <a:rPr lang="en-US" dirty="0"/>
+              <a:rPr lang="en-US" sz="2600" dirty="0">
+                <a:latin typeface="Courier" pitchFamily="2" charset="0"/>
+              </a:rPr>
+              <a:t>    &lt;/application&gt;</a:t>
+            </a:r>
+            <a:br>
+              <a:rPr lang="en-US" sz="2600" dirty="0">
+                <a:latin typeface="Courier" pitchFamily="2" charset="0"/>
+              </a:rPr>
+            </a:br>
+            <a:r>
+              <a:rPr lang="en-US" sz="2600" dirty="0">
+                <a:latin typeface="Courier" pitchFamily="2" charset="0"/>
+              </a:rPr>
               <a:t>&lt;/manifest&gt;</a:t>
             </a:r>
             <a:br>
-              <a:rPr lang="en-US" sz="2800" dirty="0"/>
+              <a:rPr lang="en-US" sz="2900" dirty="0">
+                <a:latin typeface="Courier" pitchFamily="2" charset="0"/>
+              </a:rPr>
             </a:br>
-            <a:endParaRPr lang="en-US" sz="2600" dirty="0"/>
+            <a:endParaRPr lang="en-US" sz="2900" dirty="0">
+              <a:latin typeface="Courier" pitchFamily="2" charset="0"/>
+            </a:endParaRPr>
           </a:p>
         </p:txBody>
       </p:sp>
@@ -7122,12 +7174,12 @@
         <p:spPr>
           <a:xfrm>
             <a:off x="457200" y="1237129"/>
-            <a:ext cx="8229600" cy="4861414"/>
+            <a:ext cx="8441140" cy="4861414"/>
           </a:xfrm>
         </p:spPr>
         <p:txBody>
           <a:bodyPr>
-            <a:normAutofit fontScale="77500" lnSpcReduction="20000"/>
+            <a:normAutofit fontScale="62500" lnSpcReduction="20000"/>
           </a:bodyPr>
           <a:lstStyle/>
           <a:p>
@@ -7163,191 +7215,215 @@
             </a:r>
             <a:r>
               <a:rPr lang="en-US" dirty="0"/>
-              <a:t> file should look similar to this:</a:t>
+              <a:t> file should look something like this:</a:t>
             </a:r>
           </a:p>
           <a:p>
             <a:pPr marL="0" indent="0">
               <a:buNone/>
             </a:pPr>
-            <a:endParaRPr lang="en-US" dirty="0"/>
+            <a:endParaRPr lang="en-US" dirty="0">
+              <a:latin typeface="Courier" pitchFamily="2" charset="0"/>
+            </a:endParaRPr>
           </a:p>
           <a:p>
             <a:pPr marL="0" indent="0">
               <a:buNone/>
             </a:pPr>
             <a:r>
-              <a:rPr lang="en-US" dirty="0"/>
-              <a:t>&lt;style</a:t>
-            </a:r>
-            <a:r>
-              <a:rPr lang="en-US" sz="2800" dirty="0"/>
-              <a:t> </a:t>
-            </a:r>
-            <a:r>
-              <a:rPr lang="en-US" dirty="0"/>
-              <a:t>name</a:t>
-            </a:r>
-            <a:r>
-              <a:rPr lang="en-US" sz="2800" dirty="0"/>
-              <a:t>=</a:t>
-            </a:r>
-            <a:r>
-              <a:rPr lang="en-US" dirty="0"/>
+              <a:rPr lang="en-US" dirty="0">
+                <a:latin typeface="Courier" pitchFamily="2" charset="0"/>
+              </a:rPr>
+              <a:t>&lt;style name="</a:t>
+            </a:r>
+            <a:r>
+              <a:rPr lang="en-US" dirty="0" err="1">
+                <a:latin typeface="Courier" pitchFamily="2" charset="0"/>
+              </a:rPr>
+              <a:t>AppTheme</a:t>
+            </a:r>
+            <a:r>
+              <a:rPr lang="en-US" dirty="0">
+                <a:latin typeface="Courier" pitchFamily="2" charset="0"/>
+              </a:rPr>
               <a:t>"</a:t>
             </a:r>
-            <a:r>
-              <a:rPr lang="en-US" dirty="0" err="1"/>
-              <a:t>AppTheme</a:t>
-            </a:r>
-            <a:r>
-              <a:rPr lang="en-US" dirty="0"/>
-              <a:t>"</a:t>
-            </a:r>
-            <a:r>
-              <a:rPr lang="en-US" sz="2800" dirty="0"/>
-              <a:t> </a:t>
-            </a:r>
-            <a:r>
-              <a:rPr lang="en-US" dirty="0"/>
-              <a:t>parent</a:t>
-            </a:r>
-            <a:r>
-              <a:rPr lang="en-US" sz="2800" dirty="0"/>
-              <a:t>=</a:t>
-            </a:r>
-            <a:r>
-              <a:rPr lang="en-US" dirty="0"/>
-              <a:t>"</a:t>
-            </a:r>
-            <a:r>
-              <a:rPr lang="en-US" dirty="0" err="1"/>
+            <a:br>
+              <a:rPr lang="en-US" dirty="0">
+                <a:latin typeface="Courier" pitchFamily="2" charset="0"/>
+              </a:rPr>
+            </a:br>
+            <a:r>
+              <a:rPr lang="en-US" dirty="0">
+                <a:latin typeface="Courier" pitchFamily="2" charset="0"/>
+              </a:rPr>
+              <a:t>       parent="</a:t>
+            </a:r>
+            <a:r>
+              <a:rPr lang="en-US" dirty="0" err="1">
+                <a:latin typeface="Courier" pitchFamily="2" charset="0"/>
+              </a:rPr>
               <a:t>Theme.AppCompat.Light.DarkActionBar</a:t>
             </a:r>
             <a:r>
-              <a:rPr lang="en-US" dirty="0"/>
+              <a:rPr lang="en-US" dirty="0">
+                <a:latin typeface="Courier" pitchFamily="2" charset="0"/>
+              </a:rPr>
               <a:t>"&gt;</a:t>
             </a:r>
             <a:br>
-              <a:rPr lang="en-US" sz="2800" dirty="0"/>
+              <a:rPr lang="en-US" dirty="0">
+                <a:latin typeface="Courier" pitchFamily="2" charset="0"/>
+              </a:rPr>
             </a:br>
             <a:r>
-              <a:rPr lang="en-US" sz="2800" dirty="0"/>
-              <a:t>    </a:t>
-            </a:r>
-            <a:r>
-              <a:rPr lang="en-US" dirty="0"/>
-              <a:t>&lt;!--</a:t>
-            </a:r>
-            <a:r>
-              <a:rPr lang="en-US" sz="2800" dirty="0"/>
-              <a:t> Customize your theme here. </a:t>
-            </a:r>
-            <a:r>
-              <a:rPr lang="en-US" dirty="0"/>
-              <a:t>--&gt;</a:t>
+              <a:rPr lang="en-US" dirty="0">
+                <a:latin typeface="Courier" pitchFamily="2" charset="0"/>
+              </a:rPr>
+              <a:t>   &lt;!-- Customize your theme here. --&gt;</a:t>
             </a:r>
             <a:br>
-              <a:rPr lang="en-US" sz="2800" dirty="0"/>
+              <a:rPr lang="en-US" dirty="0">
+                <a:latin typeface="Courier" pitchFamily="2" charset="0"/>
+              </a:rPr>
             </a:br>
             <a:r>
-              <a:rPr lang="en-US" sz="2800" dirty="0"/>
-              <a:t>    &lt;item name=</a:t>
-            </a:r>
-            <a:r>
-              <a:rPr lang="en-US" dirty="0"/>
-              <a:t>"</a:t>
-            </a:r>
-            <a:r>
-              <a:rPr lang="en-US" dirty="0" err="1"/>
+              <a:rPr lang="en-US" dirty="0">
+                <a:latin typeface="Courier" pitchFamily="2" charset="0"/>
+              </a:rPr>
+              <a:t>   &lt;item name="</a:t>
+            </a:r>
+            <a:r>
+              <a:rPr lang="en-US" dirty="0" err="1">
+                <a:latin typeface="Courier" pitchFamily="2" charset="0"/>
+              </a:rPr>
               <a:t>colorPrimary</a:t>
             </a:r>
             <a:r>
-              <a:rPr lang="en-US" dirty="0"/>
-              <a:t>"</a:t>
-            </a:r>
-            <a:r>
-              <a:rPr lang="en-US" sz="2800" dirty="0"/>
-              <a:t>&gt;@color/</a:t>
-            </a:r>
-            <a:r>
-              <a:rPr lang="en-US" sz="2800" dirty="0" err="1"/>
+              <a:rPr lang="en-US" dirty="0">
+                <a:latin typeface="Courier" pitchFamily="2" charset="0"/>
+              </a:rPr>
+              <a:t>"&gt;@color/</a:t>
+            </a:r>
+            <a:r>
+              <a:rPr lang="en-US" dirty="0" err="1">
+                <a:latin typeface="Courier" pitchFamily="2" charset="0"/>
+              </a:rPr>
               <a:t>colorPrimary</a:t>
             </a:r>
-            <a:r>
-              <a:rPr lang="en-US" sz="2800" dirty="0"/>
-              <a:t>&lt;/item&gt;</a:t>
-            </a:r>
             <a:br>
-              <a:rPr lang="en-US" sz="2800" dirty="0"/>
+              <a:rPr lang="en-US" dirty="0">
+                <a:latin typeface="Courier" pitchFamily="2" charset="0"/>
+              </a:rPr>
             </a:br>
             <a:r>
-              <a:rPr lang="en-US" sz="2800" dirty="0"/>
-              <a:t>    &lt;item name=</a:t>
-            </a:r>
-            <a:r>
-              <a:rPr lang="en-US" dirty="0"/>
-              <a:t>"</a:t>
-            </a:r>
-            <a:r>
-              <a:rPr lang="en-US" dirty="0" err="1"/>
+              <a:rPr lang="en-US" dirty="0">
+                <a:latin typeface="Courier" pitchFamily="2" charset="0"/>
+              </a:rPr>
+              <a:t>   &lt;/item&gt;</a:t>
+            </a:r>
+            <a:br>
+              <a:rPr lang="en-US" dirty="0">
+                <a:latin typeface="Courier" pitchFamily="2" charset="0"/>
+              </a:rPr>
+            </a:br>
+            <a:r>
+              <a:rPr lang="en-US" dirty="0">
+                <a:latin typeface="Courier" pitchFamily="2" charset="0"/>
+              </a:rPr>
+              <a:t>   &lt;item</a:t>
+            </a:r>
+            <a:br>
+              <a:rPr lang="en-US" dirty="0">
+                <a:latin typeface="Courier" pitchFamily="2" charset="0"/>
+              </a:rPr>
+            </a:br>
+            <a:r>
+              <a:rPr lang="en-US" dirty="0">
+                <a:latin typeface="Courier" pitchFamily="2" charset="0"/>
+              </a:rPr>
+              <a:t>      name="</a:t>
+            </a:r>
+            <a:r>
+              <a:rPr lang="en-US" dirty="0" err="1">
+                <a:latin typeface="Courier" pitchFamily="2" charset="0"/>
+              </a:rPr>
               <a:t>colorPrimaryDark</a:t>
             </a:r>
             <a:r>
-              <a:rPr lang="en-US" dirty="0"/>
-              <a:t>"</a:t>
-            </a:r>
-            <a:r>
-              <a:rPr lang="en-US" sz="2800" dirty="0"/>
-              <a:t>&gt;@color/</a:t>
-            </a:r>
-            <a:r>
-              <a:rPr lang="en-US" sz="2800" dirty="0" err="1"/>
+              <a:rPr lang="en-US" dirty="0">
+                <a:latin typeface="Courier" pitchFamily="2" charset="0"/>
+              </a:rPr>
+              <a:t>"&gt;@color/</a:t>
+            </a:r>
+            <a:r>
+              <a:rPr lang="en-US" dirty="0" err="1">
+                <a:latin typeface="Courier" pitchFamily="2" charset="0"/>
+              </a:rPr>
               <a:t>colorPrimaryDark</a:t>
             </a:r>
-            <a:r>
-              <a:rPr lang="en-US" sz="2800" dirty="0"/>
-              <a:t>&lt;/item&gt;</a:t>
-            </a:r>
             <a:br>
-              <a:rPr lang="en-US" sz="2800" dirty="0"/>
+              <a:rPr lang="en-US" dirty="0">
+                <a:latin typeface="Courier" pitchFamily="2" charset="0"/>
+              </a:rPr>
             </a:br>
             <a:r>
-              <a:rPr lang="en-US" sz="2800" dirty="0"/>
-              <a:t>    &lt;item name=</a:t>
-            </a:r>
-            <a:r>
-              <a:rPr lang="en-US" dirty="0"/>
-              <a:t>"</a:t>
-            </a:r>
-            <a:r>
-              <a:rPr lang="en-US" dirty="0" err="1"/>
+              <a:rPr lang="en-US" dirty="0">
+                <a:latin typeface="Courier" pitchFamily="2" charset="0"/>
+              </a:rPr>
+              <a:t>   &lt;/item&gt;</a:t>
+            </a:r>
+            <a:br>
+              <a:rPr lang="en-US" dirty="0">
+                <a:latin typeface="Courier" pitchFamily="2" charset="0"/>
+              </a:rPr>
+            </a:br>
+            <a:r>
+              <a:rPr lang="en-US" dirty="0">
+                <a:latin typeface="Courier" pitchFamily="2" charset="0"/>
+              </a:rPr>
+              <a:t>   &lt;item name="</a:t>
+            </a:r>
+            <a:r>
+              <a:rPr lang="en-US" dirty="0" err="1">
+                <a:latin typeface="Courier" pitchFamily="2" charset="0"/>
+              </a:rPr>
               <a:t>colorAccent</a:t>
             </a:r>
             <a:r>
-              <a:rPr lang="en-US" dirty="0"/>
-              <a:t>"</a:t>
-            </a:r>
-            <a:r>
-              <a:rPr lang="en-US" sz="2800" dirty="0"/>
-              <a:t>&gt;@color/</a:t>
-            </a:r>
-            <a:r>
-              <a:rPr lang="en-US" sz="2800" dirty="0" err="1"/>
+              <a:rPr lang="en-US" dirty="0">
+                <a:latin typeface="Courier" pitchFamily="2" charset="0"/>
+              </a:rPr>
+              <a:t>"&gt;@color/</a:t>
+            </a:r>
+            <a:r>
+              <a:rPr lang="en-US" dirty="0" err="1">
+                <a:latin typeface="Courier" pitchFamily="2" charset="0"/>
+              </a:rPr>
               <a:t>colorAccent</a:t>
             </a:r>
-            <a:r>
-              <a:rPr lang="en-US" sz="2800" dirty="0"/>
-              <a:t>&lt;/item&gt;</a:t>
-            </a:r>
             <a:br>
-              <a:rPr lang="en-US" sz="2800" dirty="0"/>
+              <a:rPr lang="en-US" dirty="0">
+                <a:latin typeface="Courier" pitchFamily="2" charset="0"/>
+              </a:rPr>
             </a:br>
             <a:r>
-              <a:rPr lang="en-US" dirty="0"/>
+              <a:rPr lang="en-US" dirty="0">
+                <a:latin typeface="Courier" pitchFamily="2" charset="0"/>
+              </a:rPr>
+              <a:t>   &lt;/item&gt;</a:t>
+            </a:r>
+            <a:br>
+              <a:rPr lang="en-US" dirty="0">
+                <a:latin typeface="Courier" pitchFamily="2" charset="0"/>
+              </a:rPr>
+            </a:br>
+            <a:r>
+              <a:rPr lang="en-US" dirty="0">
+                <a:latin typeface="Courier" pitchFamily="2" charset="0"/>
+              </a:rPr>
               <a:t>&lt;/style&gt;</a:t>
             </a:r>
-            <a:endParaRPr lang="en-US" sz="2600" dirty="0"/>
           </a:p>
         </p:txBody>
       </p:sp>
@@ -7365,7 +7441,7 @@
 </file>
 
 <file path=ppt/slides/slide8.xml><?xml version="1.0" encoding="utf-8"?>
-<p:sld xmlns:a="http://schemas.openxmlformats.org/drawingml/2006/main" xmlns:r="http://schemas.openxmlformats.org/officeDocument/2006/relationships" xmlns:p="http://schemas.openxmlformats.org/presentationml/2006/main">
+<p:sld xmlns:a="http://schemas.openxmlformats.org/drawingml/2006/main" xmlns:r="http://schemas.openxmlformats.org/officeDocument/2006/relationships" xmlns:p="http://schemas.openxmlformats.org/presentationml/2006/main" show="0">
   <p:cSld>
     <p:spTree>
       <p:nvGrpSpPr>
@@ -7603,7 +7679,7 @@
           <a:graphicData uri="http://schemas.openxmlformats.org/presentationml/2006/ole">
             <mc:AlternateContent xmlns:mc="http://schemas.openxmlformats.org/markup-compatibility/2006">
               <mc:Choice xmlns:v="urn:schemas-microsoft-com:vml" Requires="v">
-                <p:oleObj spid="_x0000_s1036" name="Document" r:id="rId4" imgW="7487205" imgH="5817491" progId="Word.Document.12">
+                <p:oleObj spid="_x0000_s1043" name="Document" r:id="rId4" imgW="7487205" imgH="5817491" progId="Word.Document.12">
                   <p:embed/>
                 </p:oleObj>
               </mc:Choice>

</xml_diff>